<commit_message>
Changed the title page
Title page changed in the ppt
</commit_message>
<xml_diff>
--- a/5x5x5 LED Cube.pptx
+++ b/5x5x5 LED Cube.pptx
@@ -3980,7 +3980,12 @@
             <p:ph type="subTitle" idx="1"/>
           </p:nvPr>
         </p:nvSpPr>
-        <p:spPr/>
+        <p:spPr>
+          <a:xfrm>
+            <a:off x="4267200" y="5029200"/>
+            <a:ext cx="4572000" cy="1368798"/>
+          </a:xfrm>
+        </p:spPr>
         <p:txBody>
           <a:bodyPr>
             <a:normAutofit fontScale="77500" lnSpcReduction="20000"/>
@@ -3989,10 +3994,20 @@
           <a:p>
             <a:r>
               <a:rPr lang="en-US" dirty="0" smtClean="0"/>
-              <a:t>Project By:</a:t>
-            </a:r>
-          </a:p>
-          <a:p>
+              <a:t>			Project </a:t>
+            </a:r>
+            <a:r>
+              <a:rPr lang="en-US" dirty="0" smtClean="0"/>
+              <a:t>By</a:t>
+            </a:r>
+            <a:r>
+              <a:rPr lang="en-US" dirty="0" smtClean="0"/>
+              <a:t>: </a:t>
+            </a:r>
+            <a:endParaRPr lang="en-US" dirty="0" smtClean="0"/>
+          </a:p>
+          <a:p>
+            <a:pPr algn="r"/>
             <a:r>
               <a:rPr lang="en-US" dirty="0"/>
               <a:t>	</a:t>
@@ -4003,6 +4018,7 @@
             </a:r>
           </a:p>
           <a:p>
+            <a:pPr algn="r"/>
             <a:r>
               <a:rPr lang="en-US" dirty="0"/>
               <a:t>	</a:t>
@@ -4013,13 +4029,18 @@
             </a:r>
           </a:p>
           <a:p>
+            <a:pPr algn="r"/>
             <a:r>
               <a:rPr lang="en-US" dirty="0"/>
               <a:t>	</a:t>
             </a:r>
             <a:r>
               <a:rPr lang="en-US" dirty="0" smtClean="0"/>
-              <a:t>Siva</a:t>
+              <a:t>Siva </a:t>
+            </a:r>
+            <a:r>
+              <a:rPr lang="en-US" dirty="0" err="1" smtClean="0"/>
+              <a:t>Moole</a:t>
             </a:r>
             <a:endParaRPr lang="en-US" dirty="0"/>
           </a:p>
@@ -4122,7 +4143,6 @@
               <a:rPr lang="en-US" dirty="0" smtClean="0"/>
               <a:t>Meaning we can ignore the 64 bit addressing of Serial High, Serial Low</a:t>
             </a:r>
-            <a:endParaRPr lang="en-US" dirty="0" smtClean="0"/>
           </a:p>
           <a:p>
             <a:pPr marL="457200" lvl="1" indent="-285750"/>
@@ -5431,7 +5451,6 @@
               <a:rPr lang="en-US" dirty="0" smtClean="0"/>
               <a:t>4 pieces of 10” x 6” x 1” wood cut at 45° angle</a:t>
             </a:r>
-            <a:endParaRPr lang="en-US" dirty="0" smtClean="0"/>
           </a:p>
           <a:p>
             <a:pPr marL="285750" indent="-285750">
@@ -5442,7 +5461,6 @@
               <a:rPr lang="en-US" dirty="0" smtClean="0"/>
               <a:t>1 piece of 7 ¾” x 7 ¾” x ¼” wood </a:t>
             </a:r>
-            <a:endParaRPr lang="en-US" dirty="0" smtClean="0"/>
           </a:p>
           <a:p>
             <a:pPr marL="285750" indent="-285750">
@@ -5453,7 +5471,6 @@
               <a:rPr lang="en-US" dirty="0" smtClean="0"/>
               <a:t>1 piece of 8”x8” x ¾” wood</a:t>
             </a:r>
-            <a:endParaRPr lang="en-US" dirty="0" smtClean="0"/>
           </a:p>
           <a:p>
             <a:pPr marL="285750" indent="-285750">
@@ -5462,11 +5479,7 @@
             </a:pPr>
             <a:r>
               <a:rPr lang="en-US" dirty="0" smtClean="0"/>
-              <a:t>1 Can of rubberized spray </a:t>
-            </a:r>
-            <a:r>
-              <a:rPr lang="en-US" dirty="0" smtClean="0"/>
-              <a:t>paint</a:t>
+              <a:t>1 Can of rubberized spray paint</a:t>
             </a:r>
           </a:p>
         </p:txBody>
@@ -5802,8 +5815,8 @@
           <a:chExt cx="0" cy="0"/>
         </a:xfrm>
       </p:grpSpPr>
-      <mc:AlternateContent xmlns:mc="http://schemas.openxmlformats.org/markup-compatibility/2006">
-        <mc:Choice xmlns:a14="http://schemas.microsoft.com/office/drawing/2010/main" Requires="a14">
+      <mc:AlternateContent xmlns:mc="http://schemas.openxmlformats.org/markup-compatibility/2006" xmlns:a14="http://schemas.microsoft.com/office/drawing/2010/main">
+        <mc:Choice Requires="a14">
           <p:sp>
             <p:nvSpPr>
               <p:cNvPr id="2" name="Content Placeholder 1"/>
@@ -5999,7 +6012,7 @@
             </p:txBody>
           </p:sp>
         </mc:Choice>
-        <mc:Fallback>
+        <mc:Fallback xmlns="">
           <p:sp>
             <p:nvSpPr>
               <p:cNvPr id="2" name="Content Placeholder 1"/>

</xml_diff>